<commit_message>
Domain Name System (DNS).pptx
</commit_message>
<xml_diff>
--- a/Domain Name System (DNS).pptx
+++ b/Domain Name System (DNS).pptx
@@ -7,6 +7,8 @@
   <p:sldIdLst>
     <p:sldId id="256" r:id="rId2"/>
     <p:sldId id="257" r:id="rId3"/>
+    <p:sldId id="258" r:id="rId4"/>
+    <p:sldId id="259" r:id="rId5"/>
   </p:sldIdLst>
   <p:sldSz cx="12192000" cy="6858000"/>
   <p:notesSz cx="6858000" cy="9144000"/>
@@ -105,6 +107,11 @@
       </a:defRPr>
     </a:lvl9pPr>
   </p:defaultTextStyle>
+  <p:extLst>
+    <p:ext uri="{EFAFB233-063F-42B5-8137-9DF3F51BA10A}">
+      <p15:sldGuideLst xmlns:p15="http://schemas.microsoft.com/office/powerpoint/2012/main"/>
+    </p:ext>
+  </p:extLst>
 </p:presentation>
 </file>
 
@@ -6136,22 +6143,20 @@
           <a:lstStyle/>
           <a:p>
             <a:r>
-              <a:rPr lang="en-US" sz="2200" smtClean="0">
+              <a:rPr lang="en-US" sz="4000" smtClean="0">
                 <a:latin typeface="Times New Roman" panose="02020603050405020304" pitchFamily="18" charset="0"/>
                 <a:cs typeface="Times New Roman" panose="02020603050405020304" pitchFamily="18" charset="0"/>
               </a:rPr>
-              <a:t>Dat Nguyen</a:t>
-            </a:r>
-          </a:p>
-          <a:p>
-            <a:r>
-              <a:rPr lang="en-US" sz="2200" smtClean="0">
+              <a:t>June </a:t>
+            </a:r>
+            <a:r>
+              <a:rPr lang="en-US" sz="4000" smtClean="0">
                 <a:latin typeface="Times New Roman" panose="02020603050405020304" pitchFamily="18" charset="0"/>
                 <a:cs typeface="Times New Roman" panose="02020603050405020304" pitchFamily="18" charset="0"/>
               </a:rPr>
-              <a:t>June 2015</a:t>
-            </a:r>
-            <a:endParaRPr lang="en-US" sz="2200">
+              <a:t>2015</a:t>
+            </a:r>
+            <a:endParaRPr lang="en-US" sz="4000">
               <a:latin typeface="Times New Roman" panose="02020603050405020304" pitchFamily="18" charset="0"/>
               <a:cs typeface="Times New Roman" panose="02020603050405020304" pitchFamily="18" charset="0"/>
             </a:endParaRPr>
@@ -6198,16 +6203,27 @@
             <p:ph type="title"/>
           </p:nvPr>
         </p:nvSpPr>
-        <p:spPr/>
+        <p:spPr>
+          <a:xfrm>
+            <a:off x="1484310" y="513523"/>
+            <a:ext cx="10018713" cy="1408042"/>
+          </a:xfrm>
+        </p:spPr>
         <p:txBody>
           <a:bodyPr/>
           <a:lstStyle/>
           <a:p>
             <a:r>
-              <a:rPr lang="en-US" smtClean="0"/>
+              <a:rPr lang="en-US" b="1" smtClean="0">
+                <a:latin typeface="Times New Roman" panose="02020603050405020304" pitchFamily="18" charset="0"/>
+                <a:cs typeface="Times New Roman" panose="02020603050405020304" pitchFamily="18" charset="0"/>
+              </a:rPr>
               <a:t>Agenda</a:t>
             </a:r>
-            <a:endParaRPr lang="en-US"/>
+            <a:endParaRPr lang="en-US" b="1">
+              <a:latin typeface="Times New Roman" panose="02020603050405020304" pitchFamily="18" charset="0"/>
+              <a:cs typeface="Times New Roman" panose="02020603050405020304" pitchFamily="18" charset="0"/>
+            </a:endParaRPr>
           </a:p>
         </p:txBody>
       </p:sp>
@@ -6221,12 +6237,142 @@
             <p:ph idx="1"/>
           </p:nvPr>
         </p:nvSpPr>
-        <p:spPr/>
-        <p:txBody>
-          <a:bodyPr/>
+        <p:spPr>
+          <a:xfrm>
+            <a:off x="2438401" y="1921565"/>
+            <a:ext cx="8706678" cy="3869635"/>
+          </a:xfrm>
+        </p:spPr>
+        <p:txBody>
+          <a:bodyPr>
+            <a:normAutofit lnSpcReduction="10000"/>
+          </a:bodyPr>
           <a:lstStyle/>
           <a:p>
-            <a:endParaRPr lang="en-US"/>
+            <a:pPr marL="400050" indent="-342900">
+              <a:buNone/>
+              <a:defRPr/>
+            </a:pPr>
+            <a:r>
+              <a:rPr lang="en-CA" b="1">
+                <a:latin typeface="Times New Roman" panose="02020603050405020304" pitchFamily="18" charset="0"/>
+                <a:cs typeface="Times New Roman" panose="02020603050405020304" pitchFamily="18" charset="0"/>
+              </a:rPr>
+              <a:t>I</a:t>
+            </a:r>
+            <a:r>
+              <a:rPr lang="en-CA" b="1">
+                <a:latin typeface="Times New Roman" panose="02020603050405020304" pitchFamily="18" charset="0"/>
+                <a:cs typeface="Times New Roman" panose="02020603050405020304" pitchFamily="18" charset="0"/>
+              </a:rPr>
+              <a:t>. </a:t>
+            </a:r>
+            <a:r>
+              <a:rPr lang="en-CA" b="1" smtClean="0">
+                <a:latin typeface="Times New Roman" panose="02020603050405020304" pitchFamily="18" charset="0"/>
+                <a:cs typeface="Times New Roman" panose="02020603050405020304" pitchFamily="18" charset="0"/>
+              </a:rPr>
+              <a:t>Introduction</a:t>
+            </a:r>
+            <a:endParaRPr lang="en-CA" sz="1800" b="1">
+              <a:latin typeface="Times New Roman" panose="02020603050405020304" pitchFamily="18" charset="0"/>
+              <a:cs typeface="Times New Roman" panose="02020603050405020304" pitchFamily="18" charset="0"/>
+            </a:endParaRPr>
+          </a:p>
+          <a:p>
+            <a:pPr marL="342900">
+              <a:buNone/>
+              <a:defRPr/>
+            </a:pPr>
+            <a:r>
+              <a:rPr lang="en-US" b="1">
+                <a:latin typeface="Times New Roman" panose="02020603050405020304" pitchFamily="18" charset="0"/>
+                <a:cs typeface="Times New Roman" panose="02020603050405020304" pitchFamily="18" charset="0"/>
+              </a:rPr>
+              <a:t>II.DNS in protocol</a:t>
+            </a:r>
+          </a:p>
+          <a:p>
+            <a:pPr marL="342900">
+              <a:buNone/>
+              <a:defRPr/>
+            </a:pPr>
+            <a:r>
+              <a:rPr lang="en-US" b="1">
+                <a:latin typeface="Times New Roman" panose="02020603050405020304" pitchFamily="18" charset="0"/>
+                <a:cs typeface="Times New Roman" panose="02020603050405020304" pitchFamily="18" charset="0"/>
+              </a:rPr>
+              <a:t>III. DNS in configuration</a:t>
+            </a:r>
+          </a:p>
+          <a:p>
+            <a:pPr marL="342900">
+              <a:buNone/>
+              <a:defRPr/>
+            </a:pPr>
+            <a:r>
+              <a:rPr lang="en-US" b="1">
+                <a:latin typeface="Times New Roman" panose="02020603050405020304" pitchFamily="18" charset="0"/>
+                <a:cs typeface="Times New Roman" panose="02020603050405020304" pitchFamily="18" charset="0"/>
+              </a:rPr>
+              <a:t>IV. Advanced features</a:t>
+            </a:r>
+          </a:p>
+          <a:p>
+            <a:pPr marL="342900">
+              <a:buNone/>
+              <a:defRPr/>
+            </a:pPr>
+            <a:r>
+              <a:rPr lang="en-US" b="1">
+                <a:latin typeface="Times New Roman" panose="02020603050405020304" pitchFamily="18" charset="0"/>
+                <a:cs typeface="Times New Roman" panose="02020603050405020304" pitchFamily="18" charset="0"/>
+              </a:rPr>
+              <a:t>V. Tools</a:t>
+            </a:r>
+          </a:p>
+          <a:p>
+            <a:pPr marL="342900">
+              <a:buNone/>
+              <a:defRPr/>
+            </a:pPr>
+            <a:r>
+              <a:rPr lang="en-US" b="1">
+                <a:latin typeface="Times New Roman" panose="02020603050405020304" pitchFamily="18" charset="0"/>
+                <a:cs typeface="Times New Roman" panose="02020603050405020304" pitchFamily="18" charset="0"/>
+              </a:rPr>
+              <a:t>VI. Demo</a:t>
+            </a:r>
+          </a:p>
+          <a:p>
+            <a:pPr marL="342900">
+              <a:buNone/>
+              <a:defRPr/>
+            </a:pPr>
+            <a:r>
+              <a:rPr lang="en-US" b="1">
+                <a:latin typeface="Times New Roman" panose="02020603050405020304" pitchFamily="18" charset="0"/>
+                <a:cs typeface="Times New Roman" panose="02020603050405020304" pitchFamily="18" charset="0"/>
+              </a:rPr>
+              <a:t>VII. ALU DNS 6.0</a:t>
+            </a:r>
+          </a:p>
+          <a:p>
+            <a:pPr marL="342900">
+              <a:buNone/>
+              <a:defRPr/>
+            </a:pPr>
+            <a:r>
+              <a:rPr lang="en-US" b="1">
+                <a:latin typeface="Times New Roman" panose="02020603050405020304" pitchFamily="18" charset="0"/>
+                <a:cs typeface="Times New Roman" panose="02020603050405020304" pitchFamily="18" charset="0"/>
+              </a:rPr>
+              <a:t>VIII. References</a:t>
+            </a:r>
+            <a:endParaRPr lang="en-US" b="1" dirty="0">
+              <a:latin typeface="Times New Roman" panose="02020603050405020304" pitchFamily="18" charset="0"/>
+              <a:cs typeface="Times New Roman" panose="02020603050405020304" pitchFamily="18" charset="0"/>
+            </a:endParaRPr>
           </a:p>
         </p:txBody>
       </p:sp>
@@ -6234,6 +6380,304 @@
     <p:extLst>
       <p:ext uri="{BB962C8B-B14F-4D97-AF65-F5344CB8AC3E}">
         <p14:creationId xmlns:p14="http://schemas.microsoft.com/office/powerpoint/2010/main" val="1442045574"/>
+      </p:ext>
+    </p:extLst>
+  </p:cSld>
+  <p:clrMapOvr>
+    <a:masterClrMapping/>
+  </p:clrMapOvr>
+</p:sld>
+</file>
+
+<file path=ppt/slides/slide3.xml><?xml version="1.0" encoding="utf-8"?>
+<p:sld xmlns:a="http://schemas.openxmlformats.org/drawingml/2006/main" xmlns:r="http://schemas.openxmlformats.org/officeDocument/2006/relationships" xmlns:p="http://schemas.openxmlformats.org/presentationml/2006/main">
+  <p:cSld>
+    <p:spTree>
+      <p:nvGrpSpPr>
+        <p:cNvPr id="1" name=""/>
+        <p:cNvGrpSpPr/>
+        <p:nvPr/>
+      </p:nvGrpSpPr>
+      <p:grpSpPr>
+        <a:xfrm>
+          <a:off x="0" y="0"/>
+          <a:ext cx="0" cy="0"/>
+          <a:chOff x="0" y="0"/>
+          <a:chExt cx="0" cy="0"/>
+        </a:xfrm>
+      </p:grpSpPr>
+      <p:sp>
+        <p:nvSpPr>
+          <p:cNvPr id="2" name="Title 1"/>
+          <p:cNvSpPr>
+            <a:spLocks noGrp="1"/>
+          </p:cNvSpPr>
+          <p:nvPr>
+            <p:ph type="title"/>
+          </p:nvPr>
+        </p:nvSpPr>
+        <p:spPr>
+          <a:xfrm>
+            <a:off x="1987826" y="685800"/>
+            <a:ext cx="9515198" cy="718930"/>
+          </a:xfrm>
+        </p:spPr>
+        <p:txBody>
+          <a:bodyPr>
+            <a:normAutofit/>
+          </a:bodyPr>
+          <a:lstStyle/>
+          <a:p>
+            <a:pPr lvl="1" algn="ctr" defTabSz="457200" rtl="0">
+              <a:spcBef>
+                <a:spcPct val="0"/>
+              </a:spcBef>
+            </a:pPr>
+            <a:r>
+              <a:rPr lang="en-US" sz="4000" b="1" smtClean="0">
+                <a:latin typeface="Times New Roman" panose="02020603050405020304" pitchFamily="18" charset="0"/>
+                <a:cs typeface="Times New Roman" panose="02020603050405020304" pitchFamily="18" charset="0"/>
+              </a:rPr>
+              <a:t>Introduction</a:t>
+            </a:r>
+            <a:endParaRPr lang="en-US" sz="4000" b="1">
+              <a:latin typeface="Times New Roman" panose="02020603050405020304" pitchFamily="18" charset="0"/>
+              <a:cs typeface="Times New Roman" panose="02020603050405020304" pitchFamily="18" charset="0"/>
+            </a:endParaRPr>
+          </a:p>
+        </p:txBody>
+      </p:sp>
+      <p:sp>
+        <p:nvSpPr>
+          <p:cNvPr id="4" name="Rectangle 6"/>
+          <p:cNvSpPr>
+            <a:spLocks noGrp="1" noChangeArrowheads="1"/>
+          </p:cNvSpPr>
+          <p:nvPr>
+            <p:ph idx="1"/>
+          </p:nvPr>
+        </p:nvSpPr>
+        <p:spPr>
+          <a:xfrm>
+            <a:off x="1987826" y="1577009"/>
+            <a:ext cx="9515197" cy="4572000"/>
+          </a:xfrm>
+          <a:noFill/>
+        </p:spPr>
+        <p:txBody>
+          <a:bodyPr>
+            <a:normAutofit/>
+          </a:bodyPr>
+          <a:lstStyle/>
+          <a:p>
+            <a:pPr marL="703263" lvl="1" indent="-533400"/>
+            <a:r>
+              <a:rPr lang="en-US" sz="2400" smtClean="0">
+                <a:latin typeface="Times New Roman" panose="02020603050405020304" pitchFamily="18" charset="0"/>
+                <a:cs typeface="Times New Roman" panose="02020603050405020304" pitchFamily="18" charset="0"/>
+              </a:rPr>
+              <a:t>Using a host name is preferred when communicating over a network. Easily remembered than an IP address</a:t>
+            </a:r>
+          </a:p>
+          <a:p>
+            <a:pPr marL="703263" lvl="1" indent="-533400"/>
+            <a:r>
+              <a:rPr lang="en-US" sz="2400" smtClean="0">
+                <a:latin typeface="Times New Roman" panose="02020603050405020304" pitchFamily="18" charset="0"/>
+                <a:cs typeface="Times New Roman" panose="02020603050405020304" pitchFamily="18" charset="0"/>
+              </a:rPr>
+              <a:t>Before 1982, HOSTS.TXT is used to map names to numerical addresses and each computer retrieved this file a computer at SRI</a:t>
+            </a:r>
+          </a:p>
+          <a:p>
+            <a:pPr marL="703263" lvl="1" indent="-533400"/>
+            <a:r>
+              <a:rPr lang="en-US" sz="2400" smtClean="0">
+                <a:latin typeface="Times New Roman" panose="02020603050405020304" pitchFamily="18" charset="0"/>
+                <a:cs typeface="Times New Roman" panose="02020603050405020304" pitchFamily="18" charset="0"/>
+              </a:rPr>
+              <a:t>The rapid growth of the network made a centrally maintained, hand-crafted HOSTS.TXT unsustainable</a:t>
+            </a:r>
+          </a:p>
+          <a:p>
+            <a:pPr marL="703263" lvl="1" indent="-533400"/>
+            <a:r>
+              <a:rPr lang="en-US" sz="2400" smtClean="0">
+                <a:latin typeface="Times New Roman" panose="02020603050405020304" pitchFamily="18" charset="0"/>
+                <a:cs typeface="Times New Roman" panose="02020603050405020304" pitchFamily="18" charset="0"/>
+              </a:rPr>
+              <a:t>A more scalable system is needed so Domain Name System (DNS) was invented in 1983 </a:t>
+            </a:r>
+          </a:p>
+        </p:txBody>
+      </p:sp>
+    </p:spTree>
+    <p:extLst>
+      <p:ext uri="{BB962C8B-B14F-4D97-AF65-F5344CB8AC3E}">
+        <p14:creationId xmlns:p14="http://schemas.microsoft.com/office/powerpoint/2010/main" val="1737553273"/>
+      </p:ext>
+    </p:extLst>
+  </p:cSld>
+  <p:clrMapOvr>
+    <a:masterClrMapping/>
+  </p:clrMapOvr>
+</p:sld>
+</file>
+
+<file path=ppt/slides/slide4.xml><?xml version="1.0" encoding="utf-8"?>
+<p:sld xmlns:a="http://schemas.openxmlformats.org/drawingml/2006/main" xmlns:r="http://schemas.openxmlformats.org/officeDocument/2006/relationships" xmlns:p="http://schemas.openxmlformats.org/presentationml/2006/main">
+  <p:cSld>
+    <p:spTree>
+      <p:nvGrpSpPr>
+        <p:cNvPr id="1" name=""/>
+        <p:cNvGrpSpPr/>
+        <p:nvPr/>
+      </p:nvGrpSpPr>
+      <p:grpSpPr>
+        <a:xfrm>
+          <a:off x="0" y="0"/>
+          <a:ext cx="0" cy="0"/>
+          <a:chOff x="0" y="0"/>
+          <a:chExt cx="0" cy="0"/>
+        </a:xfrm>
+      </p:grpSpPr>
+      <p:sp>
+        <p:nvSpPr>
+          <p:cNvPr id="3" name="Content Placeholder 2"/>
+          <p:cNvSpPr>
+            <a:spLocks noGrp="1"/>
+          </p:cNvSpPr>
+          <p:nvPr>
+            <p:ph idx="1"/>
+          </p:nvPr>
+        </p:nvSpPr>
+        <p:spPr>
+          <a:xfrm>
+            <a:off x="1987826" y="1206499"/>
+            <a:ext cx="9422432" cy="3124201"/>
+          </a:xfrm>
+        </p:spPr>
+        <p:txBody>
+          <a:bodyPr/>
+          <a:lstStyle/>
+          <a:p>
+            <a:r>
+              <a:rPr lang="en-US"/>
+              <a:t>DNS is a hierarchical distributed naming system for computers, services, or any resource connected to the Internet or a </a:t>
+            </a:r>
+            <a:r>
+              <a:rPr lang="en-US"/>
+              <a:t>private </a:t>
+            </a:r>
+            <a:r>
+              <a:rPr lang="en-US" smtClean="0"/>
+              <a:t>network</a:t>
+            </a:r>
+          </a:p>
+          <a:p>
+            <a:endParaRPr lang="en-US"/>
+          </a:p>
+        </p:txBody>
+      </p:sp>
+      <p:sp>
+        <p:nvSpPr>
+          <p:cNvPr id="4" name="Title 1"/>
+          <p:cNvSpPr>
+            <a:spLocks noGrp="1"/>
+          </p:cNvSpPr>
+          <p:nvPr>
+            <p:ph type="title"/>
+          </p:nvPr>
+        </p:nvSpPr>
+        <p:spPr>
+          <a:xfrm>
+            <a:off x="1987826" y="685800"/>
+            <a:ext cx="9515198" cy="718930"/>
+          </a:xfrm>
+        </p:spPr>
+        <p:txBody>
+          <a:bodyPr>
+            <a:normAutofit/>
+          </a:bodyPr>
+          <a:lstStyle/>
+          <a:p>
+            <a:pPr lvl="1" algn="ctr" defTabSz="457200" rtl="0">
+              <a:spcBef>
+                <a:spcPct val="0"/>
+              </a:spcBef>
+            </a:pPr>
+            <a:r>
+              <a:rPr lang="en-US" sz="4000" b="1" smtClean="0">
+                <a:latin typeface="Times New Roman" panose="02020603050405020304" pitchFamily="18" charset="0"/>
+                <a:cs typeface="Times New Roman" panose="02020603050405020304" pitchFamily="18" charset="0"/>
+              </a:rPr>
+              <a:t>Introduction</a:t>
+            </a:r>
+            <a:endParaRPr lang="en-US" sz="4000" b="1">
+              <a:latin typeface="Times New Roman" panose="02020603050405020304" pitchFamily="18" charset="0"/>
+              <a:cs typeface="Times New Roman" panose="02020603050405020304" pitchFamily="18" charset="0"/>
+            </a:endParaRPr>
+          </a:p>
+        </p:txBody>
+      </p:sp>
+      <p:pic>
+        <p:nvPicPr>
+          <p:cNvPr id="5" name="Picture 4" descr="domain-name-space.gif"/>
+          <p:cNvPicPr>
+            <a:picLocks noChangeAspect="1"/>
+          </p:cNvPicPr>
+          <p:nvPr/>
+        </p:nvPicPr>
+        <p:blipFill>
+          <a:blip r:embed="rId2">
+            <a:extLst>
+              <a:ext uri="{28A0092B-C50C-407E-A947-70E740481C1C}">
+                <a14:useLocalDpi xmlns:a14="http://schemas.microsoft.com/office/drawing/2010/main" val="0"/>
+              </a:ext>
+            </a:extLst>
+          </a:blip>
+          <a:srcRect/>
+          <a:stretch>
+            <a:fillRect/>
+          </a:stretch>
+        </p:blipFill>
+        <p:spPr bwMode="auto">
+          <a:xfrm>
+            <a:off x="4310063" y="2647950"/>
+            <a:ext cx="5381625" cy="4210050"/>
+          </a:xfrm>
+          <a:prstGeom prst="rect">
+            <a:avLst/>
+          </a:prstGeom>
+          <a:noFill/>
+          <a:ln>
+            <a:noFill/>
+          </a:ln>
+          <a:extLst>
+            <a:ext uri="{909E8E84-426E-40DD-AFC4-6F175D3DCCD1}">
+              <a14:hiddenFill xmlns:a14="http://schemas.microsoft.com/office/drawing/2010/main">
+                <a:solidFill>
+                  <a:srgbClr val="FFFFFF"/>
+                </a:solidFill>
+              </a14:hiddenFill>
+            </a:ext>
+            <a:ext uri="{91240B29-F687-4F45-9708-019B960494DF}">
+              <a14:hiddenLine xmlns:a14="http://schemas.microsoft.com/office/drawing/2010/main" w="9525">
+                <a:solidFill>
+                  <a:srgbClr val="000000"/>
+                </a:solidFill>
+                <a:miter lim="800000"/>
+                <a:headEnd/>
+                <a:tailEnd/>
+              </a14:hiddenLine>
+            </a:ext>
+          </a:extLst>
+        </p:spPr>
+      </p:pic>
+    </p:spTree>
+    <p:extLst>
+      <p:ext uri="{BB962C8B-B14F-4D97-AF65-F5344CB8AC3E}">
+        <p14:creationId xmlns:p14="http://schemas.microsoft.com/office/powerpoint/2010/main" val="2957419370"/>
       </p:ext>
     </p:extLst>
   </p:cSld>

</xml_diff>